<commit_message>
adds further comments to the coding
</commit_message>
<xml_diff>
--- a/Visit Scotland Presentation.pptx
+++ b/Visit Scotland Presentation.pptx
@@ -5,7 +5,7 @@
     <p:sldMasterId id="2147483672" r:id="rId1"/>
   </p:sldMasterIdLst>
   <p:notesMasterIdLst>
-    <p:notesMasterId r:id="rId16"/>
+    <p:notesMasterId r:id="rId17"/>
   </p:notesMasterIdLst>
   <p:sldIdLst>
     <p:sldId id="256" r:id="rId2"/>
@@ -22,6 +22,7 @@
     <p:sldId id="266" r:id="rId13"/>
     <p:sldId id="267" r:id="rId14"/>
     <p:sldId id="269" r:id="rId15"/>
+    <p:sldId id="270" r:id="rId16"/>
   </p:sldIdLst>
   <p:sldSz cx="12192000" cy="6858000"/>
   <p:notesSz cx="6858000" cy="9144000"/>
@@ -4727,6 +4728,249 @@
 </p:sld>
 </file>
 
+<file path=ppt/slides/slide15.xml><?xml version="1.0" encoding="utf-8"?>
+<p:sld xmlns:a="http://schemas.openxmlformats.org/drawingml/2006/main" xmlns:r="http://schemas.openxmlformats.org/officeDocument/2006/relationships" xmlns:p="http://schemas.openxmlformats.org/presentationml/2006/main">
+  <p:cSld>
+    <p:spTree>
+      <p:nvGrpSpPr>
+        <p:cNvPr id="1" name=""/>
+        <p:cNvGrpSpPr/>
+        <p:nvPr/>
+      </p:nvGrpSpPr>
+      <p:grpSpPr>
+        <a:xfrm>
+          <a:off x="0" y="0"/>
+          <a:ext cx="0" cy="0"/>
+          <a:chOff x="0" y="0"/>
+          <a:chExt cx="0" cy="0"/>
+        </a:xfrm>
+      </p:grpSpPr>
+      <p:sp>
+        <p:nvSpPr>
+          <p:cNvPr id="4" name="Title 1">
+            <a:extLst>
+              <a:ext uri="{FF2B5EF4-FFF2-40B4-BE49-F238E27FC236}">
+                <a16:creationId xmlns:a16="http://schemas.microsoft.com/office/drawing/2014/main" id="{01CAB60A-D123-234C-A5EA-D4A19AC8967A}"/>
+              </a:ext>
+            </a:extLst>
+          </p:cNvPr>
+          <p:cNvSpPr txBox="1">
+            <a:spLocks/>
+          </p:cNvSpPr>
+          <p:nvPr/>
+        </p:nvSpPr>
+        <p:spPr>
+          <a:xfrm>
+            <a:off x="0" y="0"/>
+            <a:ext cx="12192000" cy="1200329"/>
+          </a:xfrm>
+          <a:prstGeom prst="rect">
+            <a:avLst/>
+          </a:prstGeom>
+          <a:solidFill>
+            <a:srgbClr val="002060"/>
+          </a:solidFill>
+        </p:spPr>
+        <p:txBody>
+          <a:bodyPr vert="horz" lIns="91440" tIns="45720" rIns="91440" bIns="45720" rtlCol="0" anchor="ctr">
+            <a:normAutofit fontScale="97500"/>
+          </a:bodyPr>
+          <a:lstStyle>
+            <a:lvl1pPr algn="l" defTabSz="914400" rtl="0" eaLnBrk="1" latinLnBrk="0" hangingPunct="1">
+              <a:lnSpc>
+                <a:spcPct val="90000"/>
+              </a:lnSpc>
+              <a:spcBef>
+                <a:spcPct val="0"/>
+              </a:spcBef>
+              <a:buNone/>
+              <a:defRPr sz="4400" kern="1200">
+                <a:solidFill>
+                  <a:schemeClr val="tx1"/>
+                </a:solidFill>
+                <a:latin typeface="+mj-lt"/>
+                <a:ea typeface="+mj-ea"/>
+                <a:cs typeface="+mj-cs"/>
+              </a:defRPr>
+            </a:lvl1pPr>
+          </a:lstStyle>
+          <a:p>
+            <a:r>
+              <a:rPr lang="en-GB" sz="3200" dirty="0">
+                <a:solidFill>
+                  <a:schemeClr val="bg1"/>
+                </a:solidFill>
+              </a:rPr>
+              <a:t>Key Insights and further analysis	</a:t>
+            </a:r>
+          </a:p>
+        </p:txBody>
+      </p:sp>
+      <p:sp>
+        <p:nvSpPr>
+          <p:cNvPr id="2" name="TextBox 1">
+            <a:extLst>
+              <a:ext uri="{FF2B5EF4-FFF2-40B4-BE49-F238E27FC236}">
+                <a16:creationId xmlns:a16="http://schemas.microsoft.com/office/drawing/2014/main" id="{F088F5FF-A4BA-C545-B49A-F60401F42772}"/>
+              </a:ext>
+            </a:extLst>
+          </p:cNvPr>
+          <p:cNvSpPr txBox="1"/>
+          <p:nvPr/>
+        </p:nvSpPr>
+        <p:spPr>
+          <a:xfrm>
+            <a:off x="288099" y="1200329"/>
+            <a:ext cx="10797435" cy="5847755"/>
+          </a:xfrm>
+          <a:prstGeom prst="rect">
+            <a:avLst/>
+          </a:prstGeom>
+          <a:noFill/>
+        </p:spPr>
+        <p:txBody>
+          <a:bodyPr wrap="square" rtlCol="0">
+            <a:spAutoFit/>
+          </a:bodyPr>
+          <a:lstStyle/>
+          <a:p>
+            <a:r>
+              <a:rPr lang="en-US" b="1" dirty="0"/>
+              <a:t>Areas visited and Transport:</a:t>
+            </a:r>
+          </a:p>
+          <a:p>
+            <a:pPr marL="285750" indent="-285750">
+              <a:buFont typeface="Wingdings" pitchFamily="2" charset="2"/>
+              <a:buChar char="Ø"/>
+            </a:pPr>
+            <a:r>
+              <a:rPr lang="en-US" dirty="0"/>
+              <a:t>For both day visits and regional tourism, the most popular destinations were Scottish cities.</a:t>
+            </a:r>
+          </a:p>
+          <a:p>
+            <a:pPr marL="285750" indent="-285750">
+              <a:buFont typeface="Wingdings" pitchFamily="2" charset="2"/>
+              <a:buChar char="Ø"/>
+            </a:pPr>
+            <a:r>
+              <a:rPr lang="en-US" dirty="0"/>
+              <a:t>People with access to cars and spending significantly more than those without a car on day visits and 60% of all visitors are arriving by car.</a:t>
+            </a:r>
+          </a:p>
+          <a:p>
+            <a:pPr marL="285750" indent="-285750">
+              <a:buFont typeface="Wingdings" pitchFamily="2" charset="2"/>
+              <a:buChar char="Ø"/>
+            </a:pPr>
+            <a:r>
+              <a:rPr lang="en-US" dirty="0"/>
+              <a:t>Questions: What improvements need to me made to the public transport system in Scotland?</a:t>
+            </a:r>
+          </a:p>
+          <a:p>
+            <a:r>
+              <a:rPr lang="en-US" dirty="0"/>
+              <a:t>		        What can be done to roads/transport system to improve accessibility to rural parts of Scotland?</a:t>
+            </a:r>
+          </a:p>
+          <a:p>
+            <a:endParaRPr lang="en-US" dirty="0"/>
+          </a:p>
+          <a:p>
+            <a:r>
+              <a:rPr lang="en-US" b="1" dirty="0"/>
+              <a:t>Activities:</a:t>
+            </a:r>
+          </a:p>
+          <a:p>
+            <a:pPr marL="285750" indent="-285750">
+              <a:buFont typeface="Wingdings" pitchFamily="2" charset="2"/>
+              <a:buChar char="Ø"/>
+            </a:pPr>
+            <a:r>
+              <a:rPr lang="en-US" dirty="0"/>
+              <a:t>Meals and nights out are at the top of income generating activities. Therefore, it is important to get the hospitality sector back up and running as quickly as possible after covid.</a:t>
+            </a:r>
+          </a:p>
+          <a:p>
+            <a:pPr marL="285750" indent="-285750">
+              <a:buFont typeface="Wingdings" pitchFamily="2" charset="2"/>
+              <a:buChar char="Ø"/>
+            </a:pPr>
+            <a:endParaRPr lang="en-US" dirty="0"/>
+          </a:p>
+          <a:p>
+            <a:r>
+              <a:rPr lang="en-US" b="1" dirty="0"/>
+              <a:t>Regional Tourists:</a:t>
+            </a:r>
+          </a:p>
+          <a:p>
+            <a:pPr marL="285750" indent="-285750">
+              <a:buFont typeface="Wingdings" pitchFamily="2" charset="2"/>
+              <a:buChar char="Ø"/>
+            </a:pPr>
+            <a:r>
+              <a:rPr lang="en-US" dirty="0"/>
+              <a:t>Domestic tourism relies heavily on tourists from England. Efforts need to be made to maintain and increase the level of visitors from England. This will be important as international travel is opening up again and people are looking at booking foreign holidays.</a:t>
+            </a:r>
+          </a:p>
+          <a:p>
+            <a:pPr marL="285750" indent="-285750">
+              <a:buFont typeface="Wingdings" pitchFamily="2" charset="2"/>
+              <a:buChar char="Ø"/>
+            </a:pPr>
+            <a:endParaRPr lang="en-US" dirty="0"/>
+          </a:p>
+          <a:p>
+            <a:r>
+              <a:rPr lang="en-GB" b="1" dirty="0"/>
+              <a:t>Challenges and further analysis:</a:t>
+            </a:r>
+            <a:endParaRPr lang="en-US" b="1" dirty="0"/>
+          </a:p>
+          <a:p>
+            <a:pPr marL="285750" indent="-285750">
+              <a:buFont typeface="Wingdings" pitchFamily="2" charset="2"/>
+              <a:buChar char="Ø"/>
+            </a:pPr>
+            <a:r>
+              <a:rPr lang="en-US" dirty="0"/>
+              <a:t>Data only available up to 2019, therefore impacts of Covid on tourism haven’t been considered.</a:t>
+            </a:r>
+          </a:p>
+          <a:p>
+            <a:pPr marL="285750" indent="-285750">
+              <a:buFont typeface="Wingdings" pitchFamily="2" charset="2"/>
+              <a:buChar char="Ø"/>
+            </a:pPr>
+            <a:r>
+              <a:rPr lang="en-US" dirty="0"/>
+              <a:t>Data on day visits only available in years and for regional tourism in 3-year blocks therefore additional breakdown would be needed to investigate the regional trends and the seasonality of </a:t>
+            </a:r>
+            <a:r>
+              <a:rPr lang="en-US"/>
+              <a:t>the tourism.</a:t>
+            </a:r>
+            <a:endParaRPr lang="en-US" dirty="0"/>
+          </a:p>
+        </p:txBody>
+      </p:sp>
+    </p:spTree>
+    <p:extLst>
+      <p:ext uri="{BB962C8B-B14F-4D97-AF65-F5344CB8AC3E}">
+        <p14:creationId xmlns:p14="http://schemas.microsoft.com/office/powerpoint/2010/main" val="3480089446"/>
+      </p:ext>
+    </p:extLst>
+  </p:cSld>
+  <p:clrMapOvr>
+    <a:masterClrMapping/>
+  </p:clrMapOvr>
+</p:sld>
+</file>
+
 <file path=ppt/slides/slide2.xml><?xml version="1.0" encoding="utf-8"?>
 <p:sld xmlns:a="http://schemas.openxmlformats.org/drawingml/2006/main" xmlns:r="http://schemas.openxmlformats.org/officeDocument/2006/relationships" xmlns:p="http://schemas.openxmlformats.org/presentationml/2006/main">
   <p:cSld>
@@ -4788,38 +5032,6 @@
                 <a:schemeClr val="bg1"/>
               </a:solidFill>
             </a:endParaRPr>
-          </a:p>
-        </p:txBody>
-      </p:sp>
-      <p:sp>
-        <p:nvSpPr>
-          <p:cNvPr id="5" name="TextBox 4">
-            <a:extLst>
-              <a:ext uri="{FF2B5EF4-FFF2-40B4-BE49-F238E27FC236}">
-                <a16:creationId xmlns:a16="http://schemas.microsoft.com/office/drawing/2014/main" id="{530191CF-7E88-8E4E-A1CF-5C589C23DB03}"/>
-              </a:ext>
-            </a:extLst>
-          </p:cNvPr>
-          <p:cNvSpPr txBox="1"/>
-          <p:nvPr/>
-        </p:nvSpPr>
-        <p:spPr>
-          <a:xfrm>
-            <a:off x="457199" y="2123658"/>
-            <a:ext cx="10344150" cy="369332"/>
-          </a:xfrm>
-          <a:prstGeom prst="rect">
-            <a:avLst/>
-          </a:prstGeom>
-          <a:noFill/>
-        </p:spPr>
-        <p:txBody>
-          <a:bodyPr wrap="square" rtlCol="0">
-            <a:spAutoFit/>
-          </a:bodyPr>
-          <a:lstStyle/>
-          <a:p>
-            <a:endParaRPr lang="en-US" dirty="0"/>
           </a:p>
         </p:txBody>
       </p:sp>

</xml_diff>

<commit_message>
adds formatting to presentation
</commit_message>
<xml_diff>
--- a/Visit Scotland Presentation.pptx
+++ b/Visit Scotland Presentation.pptx
@@ -5,7 +5,7 @@
     <p:sldMasterId id="2147483672" r:id="rId1"/>
   </p:sldMasterIdLst>
   <p:notesMasterIdLst>
-    <p:notesMasterId r:id="rId17"/>
+    <p:notesMasterId r:id="rId18"/>
   </p:notesMasterIdLst>
   <p:sldIdLst>
     <p:sldId id="256" r:id="rId2"/>
@@ -23,6 +23,7 @@
     <p:sldId id="267" r:id="rId14"/>
     <p:sldId id="269" r:id="rId15"/>
     <p:sldId id="270" r:id="rId16"/>
+    <p:sldId id="271" r:id="rId17"/>
   </p:sldIdLst>
   <p:sldSz cx="12192000" cy="6858000"/>
   <p:notesSz cx="6858000" cy="9144000"/>
@@ -477,6 +478,90 @@
     </a:lvl9pPr>
   </p:notesStyle>
 </p:notesMaster>
+</file>
+
+<file path=ppt/notesSlides/notesSlide1.xml><?xml version="1.0" encoding="utf-8"?>
+<p:notes xmlns:a="http://schemas.openxmlformats.org/drawingml/2006/main" xmlns:r="http://schemas.openxmlformats.org/officeDocument/2006/relationships" xmlns:p="http://schemas.openxmlformats.org/presentationml/2006/main">
+  <p:cSld>
+    <p:spTree>
+      <p:nvGrpSpPr>
+        <p:cNvPr id="1" name=""/>
+        <p:cNvGrpSpPr/>
+        <p:nvPr/>
+      </p:nvGrpSpPr>
+      <p:grpSpPr>
+        <a:xfrm>
+          <a:off x="0" y="0"/>
+          <a:ext cx="0" cy="0"/>
+          <a:chOff x="0" y="0"/>
+          <a:chExt cx="0" cy="0"/>
+        </a:xfrm>
+      </p:grpSpPr>
+      <p:sp>
+        <p:nvSpPr>
+          <p:cNvPr id="2" name="Slide Image Placeholder 1"/>
+          <p:cNvSpPr>
+            <a:spLocks noGrp="1" noRot="1" noChangeAspect="1"/>
+          </p:cNvSpPr>
+          <p:nvPr>
+            <p:ph type="sldImg"/>
+          </p:nvPr>
+        </p:nvSpPr>
+        <p:spPr/>
+      </p:sp>
+      <p:sp>
+        <p:nvSpPr>
+          <p:cNvPr id="3" name="Notes Placeholder 2"/>
+          <p:cNvSpPr>
+            <a:spLocks noGrp="1"/>
+          </p:cNvSpPr>
+          <p:nvPr>
+            <p:ph type="body" idx="1"/>
+          </p:nvPr>
+        </p:nvSpPr>
+        <p:spPr/>
+        <p:txBody>
+          <a:bodyPr/>
+          <a:lstStyle/>
+          <a:p>
+            <a:endParaRPr lang="en-US" dirty="0"/>
+          </a:p>
+        </p:txBody>
+      </p:sp>
+      <p:sp>
+        <p:nvSpPr>
+          <p:cNvPr id="4" name="Slide Number Placeholder 3"/>
+          <p:cNvSpPr>
+            <a:spLocks noGrp="1"/>
+          </p:cNvSpPr>
+          <p:nvPr>
+            <p:ph type="sldNum" sz="quarter" idx="5"/>
+          </p:nvPr>
+        </p:nvSpPr>
+        <p:spPr/>
+        <p:txBody>
+          <a:bodyPr/>
+          <a:lstStyle/>
+          <a:p>
+            <a:fld id="{CADB5DD0-B79C-C34D-8B53-E0C81388C808}" type="slidenum">
+              <a:rPr lang="en-US" smtClean="0"/>
+              <a:t>16</a:t>
+            </a:fld>
+            <a:endParaRPr lang="en-US" dirty="0"/>
+          </a:p>
+        </p:txBody>
+      </p:sp>
+    </p:spTree>
+    <p:extLst>
+      <p:ext uri="{BB962C8B-B14F-4D97-AF65-F5344CB8AC3E}">
+        <p14:creationId xmlns:p14="http://schemas.microsoft.com/office/powerpoint/2010/main" val="199311886"/>
+      </p:ext>
+    </p:extLst>
+  </p:cSld>
+  <p:clrMapOvr>
+    <a:masterClrMapping/>
+  </p:clrMapOvr>
+</p:notes>
 </file>
 
 <file path=ppt/slideLayouts/slideLayout1.xml><?xml version="1.0" encoding="utf-8"?>
@@ -4340,7 +4425,7 @@
         <p:spPr>
           <a:xfrm>
             <a:off x="0" y="0"/>
-            <a:ext cx="12192000" cy="1200329"/>
+            <a:ext cx="12204526" cy="1200329"/>
           </a:xfrm>
           <a:prstGeom prst="rect">
             <a:avLst/>
@@ -4420,7 +4505,7 @@
           <a:p>
             <a:r>
               <a:rPr lang="en-US" dirty="0"/>
-              <a:t> - based on demographics of visitors from 2013 to 2019</a:t>
+              <a:t> - based on demographics data of visitors from 2013 to 2019</a:t>
             </a:r>
           </a:p>
           <a:p>
@@ -4948,13 +5033,8 @@
             </a:pPr>
             <a:r>
               <a:rPr lang="en-US" dirty="0"/>
-              <a:t>Data on day visits only available in years and for regional tourism in 3-year blocks therefore additional breakdown would be needed to investigate the regional trends and the seasonality of </a:t>
-            </a:r>
-            <a:r>
-              <a:rPr lang="en-US"/>
-              <a:t>the tourism.</a:t>
-            </a:r>
-            <a:endParaRPr lang="en-US" dirty="0"/>
+              <a:t>Data on day visits only available in years and for regional tourism in 3-year blocks therefore additional breakdown would be needed to investigate the regional trends and the seasonality of the tourism.</a:t>
+            </a:r>
           </a:p>
         </p:txBody>
       </p:sp>
@@ -4962,6 +5042,81 @@
     <p:extLst>
       <p:ext uri="{BB962C8B-B14F-4D97-AF65-F5344CB8AC3E}">
         <p14:creationId xmlns:p14="http://schemas.microsoft.com/office/powerpoint/2010/main" val="3480089446"/>
+      </p:ext>
+    </p:extLst>
+  </p:cSld>
+  <p:clrMapOvr>
+    <a:masterClrMapping/>
+  </p:clrMapOvr>
+</p:sld>
+</file>
+
+<file path=ppt/slides/slide16.xml><?xml version="1.0" encoding="utf-8"?>
+<p:sld xmlns:a="http://schemas.openxmlformats.org/drawingml/2006/main" xmlns:r="http://schemas.openxmlformats.org/officeDocument/2006/relationships" xmlns:p="http://schemas.openxmlformats.org/presentationml/2006/main">
+  <p:cSld>
+    <p:spTree>
+      <p:nvGrpSpPr>
+        <p:cNvPr id="1" name=""/>
+        <p:cNvGrpSpPr/>
+        <p:nvPr/>
+      </p:nvGrpSpPr>
+      <p:grpSpPr>
+        <a:xfrm>
+          <a:off x="0" y="0"/>
+          <a:ext cx="0" cy="0"/>
+          <a:chOff x="0" y="0"/>
+          <a:chExt cx="0" cy="0"/>
+        </a:xfrm>
+      </p:grpSpPr>
+      <p:pic>
+        <p:nvPicPr>
+          <p:cNvPr id="21508" name="Picture 4" descr="Quiz Background Blue High Res Stock Images | Shutterstock">
+            <a:extLst>
+              <a:ext uri="{FF2B5EF4-FFF2-40B4-BE49-F238E27FC236}">
+                <a16:creationId xmlns:a16="http://schemas.microsoft.com/office/drawing/2014/main" id="{EA84BE36-BF9E-C341-85F5-3F57DE076FA2}"/>
+              </a:ext>
+            </a:extLst>
+          </p:cNvPr>
+          <p:cNvPicPr>
+            <a:picLocks noChangeAspect="1" noChangeArrowheads="1"/>
+          </p:cNvPicPr>
+          <p:nvPr/>
+        </p:nvPicPr>
+        <p:blipFill rotWithShape="1">
+          <a:blip r:embed="rId3">
+            <a:extLst>
+              <a:ext uri="{28A0092B-C50C-407E-A947-70E740481C1C}">
+                <a14:useLocalDpi xmlns:a14="http://schemas.microsoft.com/office/drawing/2010/main" val="0"/>
+              </a:ext>
+            </a:extLst>
+          </a:blip>
+          <a:srcRect t="5542" b="8463"/>
+          <a:stretch/>
+        </p:blipFill>
+        <p:spPr bwMode="auto">
+          <a:xfrm>
+            <a:off x="0" y="0"/>
+            <a:ext cx="12192000" cy="6858000"/>
+          </a:xfrm>
+          <a:prstGeom prst="rect">
+            <a:avLst/>
+          </a:prstGeom>
+          <a:noFill/>
+          <a:extLst>
+            <a:ext uri="{909E8E84-426E-40DD-AFC4-6F175D3DCCD1}">
+              <a14:hiddenFill xmlns:a14="http://schemas.microsoft.com/office/drawing/2010/main">
+                <a:solidFill>
+                  <a:srgbClr val="FFFFFF"/>
+                </a:solidFill>
+              </a14:hiddenFill>
+            </a:ext>
+          </a:extLst>
+        </p:spPr>
+      </p:pic>
+    </p:spTree>
+    <p:extLst>
+      <p:ext uri="{BB962C8B-B14F-4D97-AF65-F5344CB8AC3E}">
+        <p14:creationId xmlns:p14="http://schemas.microsoft.com/office/powerpoint/2010/main" val="153251750"/>
       </p:ext>
     </p:extLst>
   </p:cSld>
@@ -5226,7 +5381,7 @@
                   <a:schemeClr val="bg1"/>
                 </a:solidFill>
               </a:rPr>
-              <a:t>What activities attract most visitors and generate most revenue?</a:t>
+              <a:t>Day Visits: What activities attract most visitors and generate most revenue?</a:t>
             </a:r>
             <a:endParaRPr lang="en-US" sz="3200" dirty="0">
               <a:solidFill>
@@ -5468,7 +5623,7 @@
                   <a:schemeClr val="bg1"/>
                 </a:solidFill>
               </a:rPr>
-              <a:t>Top Activities by visits</a:t>
+              <a:t>Day Visits: Top Activities by visits</a:t>
             </a:r>
             <a:br>
               <a:rPr lang="en-GB" sz="3200" b="1" dirty="0">
@@ -5603,7 +5758,7 @@
         </p:spPr>
         <p:txBody>
           <a:bodyPr vert="horz" lIns="91440" tIns="45720" rIns="91440" bIns="45720" rtlCol="0" anchor="ctr">
-            <a:normAutofit fontScale="90000" lnSpcReduction="20000"/>
+            <a:normAutofit fontScale="82500" lnSpcReduction="20000"/>
           </a:bodyPr>
           <a:lstStyle>
             <a:lvl1pPr algn="l" defTabSz="914400" rtl="0" eaLnBrk="1" latinLnBrk="0" hangingPunct="1">
@@ -5632,6 +5787,14 @@
             </a:endParaRPr>
           </a:p>
           <a:p>
+            <a:r>
+              <a:rPr lang="en-GB" sz="3600" b="1" dirty="0">
+                <a:solidFill>
+                  <a:schemeClr val="bg1"/>
+                </a:solidFill>
+              </a:rPr>
+              <a:t>Day Visits: </a:t>
+            </a:r>
             <a:r>
               <a:rPr lang="en-GB" sz="3300" b="1" dirty="0">
                 <a:solidFill>
@@ -5750,7 +5913,7 @@
           <p:nvPr>
             <p:extLst>
               <p:ext uri="{D42A27DB-BD31-4B8C-83A1-F6EECF244321}">
-                <p14:modId xmlns:p14="http://schemas.microsoft.com/office/powerpoint/2010/main" val="2463318641"/>
+                <p14:modId xmlns:p14="http://schemas.microsoft.com/office/powerpoint/2010/main" val="2991204441"/>
               </p:ext>
             </p:extLst>
           </p:nvPr>
@@ -7600,7 +7763,7 @@
                   <a:schemeClr val="bg1"/>
                 </a:solidFill>
               </a:rPr>
-              <a:t>Difference in Expenditure and Visits for Car Accessibility and Employment Status</a:t>
+              <a:t>Day Visits: Difference in Expenditure and Visits for Car Accessibility and Employment Status</a:t>
             </a:r>
             <a:br>
               <a:rPr lang="en-GB" b="1" dirty="0">
@@ -7699,7 +7862,7 @@
                   <a:schemeClr val="bg1"/>
                 </a:solidFill>
               </a:rPr>
-              <a:t>Difference in Expenditure and Visits for Marital and Family Status</a:t>
+              <a:t>Day Visits: Difference in Expenditure and Visits for Marital and Family Status</a:t>
             </a:r>
             <a:endParaRPr lang="en-US" sz="3200" dirty="0"/>
           </a:p>
@@ -7846,6 +8009,14 @@
           </a:lstStyle>
           <a:p>
             <a:r>
+              <a:rPr lang="en-GB" sz="3200" b="1" dirty="0">
+                <a:solidFill>
+                  <a:schemeClr val="bg1"/>
+                </a:solidFill>
+              </a:rPr>
+              <a:t>Day Visits: </a:t>
+            </a:r>
+            <a:r>
               <a:rPr lang="en-GB" sz="3200" dirty="0">
                 <a:solidFill>
                   <a:schemeClr val="bg1"/>
@@ -9715,6 +9886,14 @@
             </a:lvl1pPr>
           </a:lstStyle>
           <a:p>
+            <a:r>
+              <a:rPr lang="en-GB" sz="3200" b="1" dirty="0">
+                <a:solidFill>
+                  <a:schemeClr val="bg1"/>
+                </a:solidFill>
+              </a:rPr>
+              <a:t>Day Visits: </a:t>
+            </a:r>
             <a:r>
               <a:rPr lang="en-GB" sz="3200" dirty="0">
                 <a:solidFill>

</xml_diff>

<commit_message>
corrects regional tourism graphs
</commit_message>
<xml_diff>
--- a/Visit Scotland Presentation.pptx
+++ b/Visit Scotland Presentation.pptx
@@ -3703,36 +3703,6 @@
       </p:sp>
       <p:pic>
         <p:nvPicPr>
-          <p:cNvPr id="7" name="Picture 6" descr="Chart&#10;&#10;Description automatically generated">
-            <a:extLst>
-              <a:ext uri="{FF2B5EF4-FFF2-40B4-BE49-F238E27FC236}">
-                <a16:creationId xmlns:a16="http://schemas.microsoft.com/office/drawing/2014/main" id="{A0BC8ADF-A46E-2B42-86D7-40D38ECE3F1C}"/>
-              </a:ext>
-            </a:extLst>
-          </p:cNvPr>
-          <p:cNvPicPr>
-            <a:picLocks noChangeAspect="1"/>
-          </p:cNvPicPr>
-          <p:nvPr/>
-        </p:nvPicPr>
-        <p:blipFill>
-          <a:blip r:embed="rId2"/>
-          <a:stretch>
-            <a:fillRect/>
-          </a:stretch>
-        </p:blipFill>
-        <p:spPr>
-          <a:xfrm>
-            <a:off x="207962" y="1371600"/>
-            <a:ext cx="6850064" cy="5172075"/>
-          </a:xfrm>
-          <a:prstGeom prst="rect">
-            <a:avLst/>
-          </a:prstGeom>
-        </p:spPr>
-      </p:pic>
-      <p:pic>
-        <p:nvPicPr>
           <p:cNvPr id="9" name="Picture 8" descr="Chart, scatter chart&#10;&#10;Description automatically generated">
             <a:extLst>
               <a:ext uri="{FF2B5EF4-FFF2-40B4-BE49-F238E27FC236}">
@@ -3746,7 +3716,7 @@
           <p:nvPr/>
         </p:nvPicPr>
         <p:blipFill rotWithShape="1">
-          <a:blip r:embed="rId3"/>
+          <a:blip r:embed="rId2"/>
           <a:srcRect l="32004" r="26636"/>
           <a:stretch/>
         </p:blipFill>
@@ -3754,6 +3724,36 @@
           <a:xfrm>
             <a:off x="8115301" y="1371600"/>
             <a:ext cx="3571875" cy="5486400"/>
+          </a:xfrm>
+          <a:prstGeom prst="rect">
+            <a:avLst/>
+          </a:prstGeom>
+        </p:spPr>
+      </p:pic>
+      <p:pic>
+        <p:nvPicPr>
+          <p:cNvPr id="12" name="Picture 11" descr="Chart&#10;&#10;Description automatically generated">
+            <a:extLst>
+              <a:ext uri="{FF2B5EF4-FFF2-40B4-BE49-F238E27FC236}">
+                <a16:creationId xmlns:a16="http://schemas.microsoft.com/office/drawing/2014/main" id="{C1FB033E-690B-D549-A8BF-BB2817473D9C}"/>
+              </a:ext>
+            </a:extLst>
+          </p:cNvPr>
+          <p:cNvPicPr>
+            <a:picLocks noChangeAspect="1"/>
+          </p:cNvPicPr>
+          <p:nvPr/>
+        </p:nvPicPr>
+        <p:blipFill>
+          <a:blip r:embed="rId3"/>
+          <a:stretch>
+            <a:fillRect/>
+          </a:stretch>
+        </p:blipFill>
+        <p:spPr>
+          <a:xfrm>
+            <a:off x="0" y="1371600"/>
+            <a:ext cx="8115301" cy="5091830"/>
           </a:xfrm>
           <a:prstGeom prst="rect">
             <a:avLst/>
@@ -3851,36 +3851,6 @@
           </a:p>
         </p:txBody>
       </p:sp>
-      <p:pic>
-        <p:nvPicPr>
-          <p:cNvPr id="3" name="Picture 2" descr="Chart, bar chart&#10;&#10;Description automatically generated">
-            <a:extLst>
-              <a:ext uri="{FF2B5EF4-FFF2-40B4-BE49-F238E27FC236}">
-                <a16:creationId xmlns:a16="http://schemas.microsoft.com/office/drawing/2014/main" id="{96591340-F9F1-EC40-B7F2-45221BF7C88B}"/>
-              </a:ext>
-            </a:extLst>
-          </p:cNvPr>
-          <p:cNvPicPr>
-            <a:picLocks noChangeAspect="1"/>
-          </p:cNvPicPr>
-          <p:nvPr/>
-        </p:nvPicPr>
-        <p:blipFill>
-          <a:blip r:embed="rId2"/>
-          <a:stretch>
-            <a:fillRect/>
-          </a:stretch>
-        </p:blipFill>
-        <p:spPr>
-          <a:xfrm>
-            <a:off x="157164" y="1517741"/>
-            <a:ext cx="8029574" cy="5105253"/>
-          </a:xfrm>
-          <a:prstGeom prst="rect">
-            <a:avLst/>
-          </a:prstGeom>
-        </p:spPr>
-      </p:pic>
       <p:sp>
         <p:nvSpPr>
           <p:cNvPr id="5" name="TextBox 4">
@@ -3940,7 +3910,7 @@
           <p:nvPr/>
         </p:nvPicPr>
         <p:blipFill>
-          <a:blip r:embed="rId3">
+          <a:blip r:embed="rId2">
             <a:extLst>
               <a:ext uri="{28A0092B-C50C-407E-A947-70E740481C1C}">
                 <a14:useLocalDpi xmlns:a14="http://schemas.microsoft.com/office/drawing/2010/main" val="0"/>
@@ -3970,6 +3940,36 @@
               </a14:hiddenFill>
             </a:ext>
           </a:extLst>
+        </p:spPr>
+      </p:pic>
+      <p:pic>
+        <p:nvPicPr>
+          <p:cNvPr id="10" name="Picture 9" descr="Chart, bar chart&#10;&#10;Description automatically generated">
+            <a:extLst>
+              <a:ext uri="{FF2B5EF4-FFF2-40B4-BE49-F238E27FC236}">
+                <a16:creationId xmlns:a16="http://schemas.microsoft.com/office/drawing/2014/main" id="{01B719EA-FE0F-8A47-BAD6-17B8DAC04C18}"/>
+              </a:ext>
+            </a:extLst>
+          </p:cNvPr>
+          <p:cNvPicPr>
+            <a:picLocks noChangeAspect="1"/>
+          </p:cNvPicPr>
+          <p:nvPr/>
+        </p:nvPicPr>
+        <p:blipFill>
+          <a:blip r:embed="rId3"/>
+          <a:stretch>
+            <a:fillRect/>
+          </a:stretch>
+        </p:blipFill>
+        <p:spPr>
+          <a:xfrm>
+            <a:off x="0" y="1517741"/>
+            <a:ext cx="8250648" cy="5091829"/>
+          </a:xfrm>
+          <a:prstGeom prst="rect">
+            <a:avLst/>
+          </a:prstGeom>
         </p:spPr>
       </p:pic>
     </p:spTree>

</xml_diff>